<commit_message>
Add presentation with modifications
</commit_message>
<xml_diff>
--- a/documents/Презентация FOX.pptx
+++ b/documents/Презентация FOX.pptx
@@ -267,7 +267,7 @@
           <a:p>
             <a:fld id="{C3896D09-A671-48AA-A4C9-3A253DD84F22}" type="datetimeFigureOut">
               <a:rPr lang="ru-RU" smtClean="0"/>
-              <a:t>23.01.2025</a:t>
+              <a:t>27.01.2025</a:t>
             </a:fld>
             <a:endParaRPr lang="ru-RU"/>
           </a:p>
@@ -465,7 +465,7 @@
           <a:p>
             <a:fld id="{C3896D09-A671-48AA-A4C9-3A253DD84F22}" type="datetimeFigureOut">
               <a:rPr lang="ru-RU" smtClean="0"/>
-              <a:t>23.01.2025</a:t>
+              <a:t>27.01.2025</a:t>
             </a:fld>
             <a:endParaRPr lang="ru-RU"/>
           </a:p>
@@ -673,7 +673,7 @@
           <a:p>
             <a:fld id="{C3896D09-A671-48AA-A4C9-3A253DD84F22}" type="datetimeFigureOut">
               <a:rPr lang="ru-RU" smtClean="0"/>
-              <a:t>23.01.2025</a:t>
+              <a:t>27.01.2025</a:t>
             </a:fld>
             <a:endParaRPr lang="ru-RU"/>
           </a:p>
@@ -871,7 +871,7 @@
           <a:p>
             <a:fld id="{C3896D09-A671-48AA-A4C9-3A253DD84F22}" type="datetimeFigureOut">
               <a:rPr lang="ru-RU" smtClean="0"/>
-              <a:t>23.01.2025</a:t>
+              <a:t>27.01.2025</a:t>
             </a:fld>
             <a:endParaRPr lang="ru-RU"/>
           </a:p>
@@ -1069,7 +1069,7 @@
           <a:p>
             <a:fld id="{C3896D09-A671-48AA-A4C9-3A253DD84F22}" type="datetimeFigureOut">
               <a:rPr lang="ru-RU" smtClean="0"/>
-              <a:t>23.01.2025</a:t>
+              <a:t>27.01.2025</a:t>
             </a:fld>
             <a:endParaRPr lang="ru-RU"/>
           </a:p>
@@ -1344,7 +1344,7 @@
           <a:p>
             <a:fld id="{C3896D09-A671-48AA-A4C9-3A253DD84F22}" type="datetimeFigureOut">
               <a:rPr lang="ru-RU" smtClean="0"/>
-              <a:t>23.01.2025</a:t>
+              <a:t>27.01.2025</a:t>
             </a:fld>
             <a:endParaRPr lang="ru-RU"/>
           </a:p>
@@ -1609,7 +1609,7 @@
           <a:p>
             <a:fld id="{C3896D09-A671-48AA-A4C9-3A253DD84F22}" type="datetimeFigureOut">
               <a:rPr lang="ru-RU" smtClean="0"/>
-              <a:t>23.01.2025</a:t>
+              <a:t>27.01.2025</a:t>
             </a:fld>
             <a:endParaRPr lang="ru-RU"/>
           </a:p>
@@ -2021,7 +2021,7 @@
           <a:p>
             <a:fld id="{C3896D09-A671-48AA-A4C9-3A253DD84F22}" type="datetimeFigureOut">
               <a:rPr lang="ru-RU" smtClean="0"/>
-              <a:t>23.01.2025</a:t>
+              <a:t>27.01.2025</a:t>
             </a:fld>
             <a:endParaRPr lang="ru-RU"/>
           </a:p>
@@ -2162,7 +2162,7 @@
           <a:p>
             <a:fld id="{C3896D09-A671-48AA-A4C9-3A253DD84F22}" type="datetimeFigureOut">
               <a:rPr lang="ru-RU" smtClean="0"/>
-              <a:t>23.01.2025</a:t>
+              <a:t>27.01.2025</a:t>
             </a:fld>
             <a:endParaRPr lang="ru-RU"/>
           </a:p>
@@ -2275,7 +2275,7 @@
           <a:p>
             <a:fld id="{C3896D09-A671-48AA-A4C9-3A253DD84F22}" type="datetimeFigureOut">
               <a:rPr lang="ru-RU" smtClean="0"/>
-              <a:t>23.01.2025</a:t>
+              <a:t>27.01.2025</a:t>
             </a:fld>
             <a:endParaRPr lang="ru-RU"/>
           </a:p>
@@ -2586,7 +2586,7 @@
           <a:p>
             <a:fld id="{C3896D09-A671-48AA-A4C9-3A253DD84F22}" type="datetimeFigureOut">
               <a:rPr lang="ru-RU" smtClean="0"/>
-              <a:t>23.01.2025</a:t>
+              <a:t>27.01.2025</a:t>
             </a:fld>
             <a:endParaRPr lang="ru-RU"/>
           </a:p>
@@ -2874,7 +2874,7 @@
           <a:p>
             <a:fld id="{C3896D09-A671-48AA-A4C9-3A253DD84F22}" type="datetimeFigureOut">
               <a:rPr lang="ru-RU" smtClean="0"/>
-              <a:t>23.01.2025</a:t>
+              <a:t>27.01.2025</a:t>
             </a:fld>
             <a:endParaRPr lang="ru-RU"/>
           </a:p>
@@ -3115,7 +3115,7 @@
           <a:p>
             <a:fld id="{C3896D09-A671-48AA-A4C9-3A253DD84F22}" type="datetimeFigureOut">
               <a:rPr lang="ru-RU" smtClean="0"/>
-              <a:t>23.01.2025</a:t>
+              <a:t>27.01.2025</a:t>
             </a:fld>
             <a:endParaRPr lang="ru-RU"/>
           </a:p>
@@ -3555,10 +3555,10 @@
           <a:lstStyle/>
           <a:p>
             <a:r>
-              <a:rPr lang="en-US" dirty="0"/>
+              <a:rPr lang="en-US" b="1" dirty="0"/>
               <a:t>FOX</a:t>
             </a:r>
-            <a:endParaRPr lang="ru-RU" dirty="0"/>
+            <a:endParaRPr lang="ru-RU" b="1" dirty="0"/>
           </a:p>
         </p:txBody>
       </p:sp>
@@ -3618,7 +3618,7 @@
           <a:lstStyle/>
           <a:p>
             <a:r>
-              <a:rPr lang="ru-RU" sz="2400" dirty="0"/>
+              <a:rPr lang="ru-RU" sz="2400" b="1" dirty="0"/>
               <a:t>Выполнили:</a:t>
             </a:r>
           </a:p>
@@ -3688,7 +3688,7 @@
           <a:lstStyle/>
           <a:p>
             <a:r>
-              <a:rPr lang="ru-RU"/>
+              <a:rPr lang="ru-RU" b="1" dirty="0"/>
               <a:t>Введение</a:t>
             </a:r>
           </a:p>
@@ -3793,7 +3793,7 @@
           <a:lstStyle/>
           <a:p>
             <a:r>
-              <a:rPr lang="ru-RU" sz="3400" dirty="0"/>
+              <a:rPr lang="ru-RU" sz="3400" b="1" dirty="0"/>
               <a:t>Дерево проекта (1)</a:t>
             </a:r>
           </a:p>
@@ -3814,7 +3814,7 @@
         <p:spPr>
           <a:xfrm>
             <a:off x="228600" y="522771"/>
-            <a:ext cx="6096000" cy="6186309"/>
+            <a:ext cx="6096000" cy="5909310"/>
           </a:xfrm>
           <a:prstGeom prst="rect">
             <a:avLst/>
@@ -3838,7 +3838,15 @@
           <a:p>
             <a:r>
               <a:rPr lang="en-US" dirty="0"/>
-              <a:t>├── assets/                          # </a:t>
+              <a:t>├── assets/                         </a:t>
+            </a:r>
+            <a:r>
+              <a:rPr lang="ru-RU" dirty="0"/>
+              <a:t>          </a:t>
+            </a:r>
+            <a:r>
+              <a:rPr lang="en-US" dirty="0"/>
+              <a:t># </a:t>
             </a:r>
             <a:r>
               <a:rPr lang="ru-RU" dirty="0"/>
@@ -3852,7 +3860,15 @@
             </a:r>
             <a:r>
               <a:rPr lang="en-US" dirty="0"/>
-              <a:t>levels/                          # </a:t>
+              <a:t>levels/                          </a:t>
+            </a:r>
+            <a:r>
+              <a:rPr lang="ru-RU" dirty="0"/>
+              <a:t>          </a:t>
+            </a:r>
+            <a:r>
+              <a:rPr lang="en-US" dirty="0"/>
+              <a:t># </a:t>
             </a:r>
             <a:r>
               <a:rPr lang="ru-RU" dirty="0"/>
@@ -3866,7 +3882,15 @@
             </a:r>
             <a:r>
               <a:rPr lang="en-US" dirty="0"/>
-              <a:t>chapter_1/                   	# </a:t>
+              <a:t>chapter_1/            </a:t>
+            </a:r>
+            <a:r>
+              <a:rPr lang="ru-RU" dirty="0"/>
+              <a:t>              </a:t>
+            </a:r>
+            <a:r>
+              <a:rPr lang="en-US" dirty="0"/>
+              <a:t> # </a:t>
             </a:r>
             <a:r>
               <a:rPr lang="ru-RU" dirty="0"/>
@@ -3880,7 +3904,15 @@
             </a:r>
             <a:r>
               <a:rPr lang="en-US" dirty="0"/>
-              <a:t>level_1_1.json           	  # </a:t>
+              <a:t>level_1_1.json        </a:t>
+            </a:r>
+            <a:r>
+              <a:rPr lang="ru-RU" dirty="0"/>
+              <a:t>            </a:t>
+            </a:r>
+            <a:r>
+              <a:rPr lang="en-US" dirty="0"/>
+              <a:t># </a:t>
             </a:r>
             <a:r>
               <a:rPr lang="ru-RU" dirty="0"/>
@@ -3890,7 +3922,7 @@
           <a:p>
             <a:r>
               <a:rPr lang="ru-RU" dirty="0"/>
-              <a:t>│   ├── ...                            # Другие главы</a:t>
+              <a:t>│   ├── ...                                           # Другие главы</a:t>
             </a:r>
           </a:p>
           <a:p>
@@ -3904,7 +3936,7 @@
             </a:r>
             <a:r>
               <a:rPr lang="en-US" dirty="0"/>
-              <a:t>/              # </a:t>
+              <a:t>/          # </a:t>
             </a:r>
             <a:r>
               <a:rPr lang="ru-RU" dirty="0"/>
@@ -3918,7 +3950,15 @@
             </a:r>
             <a:r>
               <a:rPr lang="en-US" dirty="0"/>
-              <a:t>images/                      # </a:t>
+              <a:t>images/                      </a:t>
+            </a:r>
+            <a:r>
+              <a:rPr lang="ru-RU" dirty="0"/>
+              <a:t>         </a:t>
+            </a:r>
+            <a:r>
+              <a:rPr lang="en-US" dirty="0"/>
+              <a:t># </a:t>
             </a:r>
             <a:r>
               <a:rPr lang="ru-RU" dirty="0"/>
@@ -3932,7 +3972,15 @@
             </a:r>
             <a:r>
               <a:rPr lang="en-US" dirty="0"/>
-              <a:t>sounds/                      # </a:t>
+              <a:t>sounds/                      </a:t>
+            </a:r>
+            <a:r>
+              <a:rPr lang="ru-RU" dirty="0"/>
+              <a:t>         </a:t>
+            </a:r>
+            <a:r>
+              <a:rPr lang="en-US" dirty="0"/>
+              <a:t># </a:t>
             </a:r>
             <a:r>
               <a:rPr lang="ru-RU" dirty="0"/>
@@ -3946,7 +3994,15 @@
             </a:r>
             <a:r>
               <a:rPr lang="en-US" dirty="0"/>
-              <a:t>fonts/                       # </a:t>
+              <a:t>fonts/                       </a:t>
+            </a:r>
+            <a:r>
+              <a:rPr lang="ru-RU" dirty="0"/>
+              <a:t>            </a:t>
+            </a:r>
+            <a:r>
+              <a:rPr lang="en-US" dirty="0"/>
+              <a:t># </a:t>
             </a:r>
             <a:r>
               <a:rPr lang="ru-RU" dirty="0"/>
@@ -3964,7 +4020,15 @@
             </a:r>
             <a:r>
               <a:rPr lang="en-US" dirty="0"/>
-              <a:t>/                             # </a:t>
+              <a:t>/                             </a:t>
+            </a:r>
+            <a:r>
+              <a:rPr lang="ru-RU" dirty="0"/>
+              <a:t>            </a:t>
+            </a:r>
+            <a:r>
+              <a:rPr lang="en-US" dirty="0"/>
+              <a:t># </a:t>
             </a:r>
             <a:r>
               <a:rPr lang="ru-RU" dirty="0"/>
@@ -3978,7 +4042,15 @@
             </a:r>
             <a:r>
               <a:rPr lang="en-US" dirty="0"/>
-              <a:t>init__.py                    # </a:t>
+              <a:t>init__.py                    </a:t>
+            </a:r>
+            <a:r>
+              <a:rPr lang="ru-RU" dirty="0"/>
+              <a:t>      </a:t>
+            </a:r>
+            <a:r>
+              <a:rPr lang="en-US" dirty="0"/>
+              <a:t># </a:t>
             </a:r>
             <a:r>
               <a:rPr lang="ru-RU" dirty="0"/>
@@ -3992,7 +4064,15 @@
             </a:r>
             <a:r>
               <a:rPr lang="en-US" dirty="0"/>
-              <a:t>main.py                        # </a:t>
+              <a:t>main.py                        </a:t>
+            </a:r>
+            <a:r>
+              <a:rPr lang="ru-RU" dirty="0"/>
+              <a:t>       </a:t>
+            </a:r>
+            <a:r>
+              <a:rPr lang="en-US" dirty="0"/>
+              <a:t># </a:t>
             </a:r>
             <a:r>
               <a:rPr lang="ru-RU" dirty="0"/>
@@ -4006,7 +4086,15 @@
             </a:r>
             <a:r>
               <a:rPr lang="en-US" dirty="0"/>
-              <a:t>game.py                        # </a:t>
+              <a:t>game.py                        </a:t>
+            </a:r>
+            <a:r>
+              <a:rPr lang="ru-RU" dirty="0"/>
+              <a:t>      </a:t>
+            </a:r>
+            <a:r>
+              <a:rPr lang="en-US" dirty="0"/>
+              <a:t># </a:t>
             </a:r>
             <a:r>
               <a:rPr lang="ru-RU" dirty="0"/>
@@ -4020,7 +4108,15 @@
             </a:r>
             <a:r>
               <a:rPr lang="en-US" dirty="0"/>
-              <a:t>settings.py                    # </a:t>
+              <a:t>settings.py                   </a:t>
+            </a:r>
+            <a:r>
+              <a:rPr lang="ru-RU" dirty="0"/>
+              <a:t>      </a:t>
+            </a:r>
+            <a:r>
+              <a:rPr lang="en-US" dirty="0"/>
+              <a:t> # </a:t>
             </a:r>
             <a:r>
               <a:rPr lang="ru-RU" dirty="0"/>
@@ -4034,7 +4130,15 @@
             </a:r>
             <a:r>
               <a:rPr lang="en-US" dirty="0"/>
-              <a:t>utils.py                       # </a:t>
+              <a:t>utils.py                       </a:t>
+            </a:r>
+            <a:r>
+              <a:rPr lang="ru-RU" dirty="0"/>
+              <a:t>         </a:t>
+            </a:r>
+            <a:r>
+              <a:rPr lang="en-US" dirty="0"/>
+              <a:t># </a:t>
             </a:r>
             <a:r>
               <a:rPr lang="ru-RU" dirty="0"/>
@@ -4048,7 +4152,15 @@
             </a:r>
             <a:r>
               <a:rPr lang="en-US" dirty="0"/>
-              <a:t>graphics/                      # </a:t>
+              <a:t>graphics/                      </a:t>
+            </a:r>
+            <a:r>
+              <a:rPr lang="ru-RU" dirty="0"/>
+              <a:t>      </a:t>
+            </a:r>
+            <a:r>
+              <a:rPr lang="en-US" dirty="0"/>
+              <a:t># </a:t>
             </a:r>
             <a:r>
               <a:rPr lang="ru-RU" dirty="0"/>
@@ -4062,7 +4174,15 @@
             </a:r>
             <a:r>
               <a:rPr lang="en-US" dirty="0"/>
-              <a:t>init__.py                  # </a:t>
+              <a:t>init__.py                  </a:t>
+            </a:r>
+            <a:r>
+              <a:rPr lang="ru-RU" dirty="0"/>
+              <a:t>     </a:t>
+            </a:r>
+            <a:r>
+              <a:rPr lang="en-US" dirty="0"/>
+              <a:t># </a:t>
             </a:r>
             <a:r>
               <a:rPr lang="ru-RU" dirty="0"/>
@@ -4076,7 +4196,15 @@
             </a:r>
             <a:r>
               <a:rPr lang="en-US" dirty="0"/>
-              <a:t>menu.py                      # </a:t>
+              <a:t>menu.py                      </a:t>
+            </a:r>
+            <a:r>
+              <a:rPr lang="ru-RU" dirty="0"/>
+              <a:t>     </a:t>
+            </a:r>
+            <a:r>
+              <a:rPr lang="en-US" dirty="0"/>
+              <a:t># </a:t>
             </a:r>
             <a:r>
               <a:rPr lang="ru-RU" dirty="0"/>
@@ -4090,7 +4218,15 @@
             </a:r>
             <a:r>
               <a:rPr lang="en-US" dirty="0"/>
-              <a:t>hud.py                       # </a:t>
+              <a:t>hud.py                       </a:t>
+            </a:r>
+            <a:r>
+              <a:rPr lang="ru-RU" dirty="0"/>
+              <a:t>       </a:t>
+            </a:r>
+            <a:r>
+              <a:rPr lang="en-US" dirty="0"/>
+              <a:t># </a:t>
             </a:r>
             <a:r>
               <a:rPr lang="ru-RU" dirty="0"/>
@@ -4104,7 +4240,15 @@
             </a:r>
             <a:r>
               <a:rPr lang="en-US" dirty="0"/>
-              <a:t>transitions.py               # </a:t>
+              <a:t>transitions.py               </a:t>
+            </a:r>
+            <a:r>
+              <a:rPr lang="ru-RU" dirty="0"/>
+              <a:t>    </a:t>
+            </a:r>
+            <a:r>
+              <a:rPr lang="en-US" dirty="0"/>
+              <a:t># </a:t>
             </a:r>
             <a:r>
               <a:rPr lang="ru-RU" dirty="0"/>
@@ -4172,7 +4316,7 @@
           <a:lstStyle/>
           <a:p>
             <a:r>
-              <a:rPr lang="ru-RU" sz="3400" dirty="0"/>
+              <a:rPr lang="ru-RU" sz="3400" b="1" dirty="0"/>
               <a:t>Дерево проекта (2)</a:t>
             </a:r>
           </a:p>
@@ -4207,7 +4351,15 @@
           <a:p>
             <a:r>
               <a:rPr lang="en-US" dirty="0"/>
-              <a:t>│   ├── entities/                      # </a:t>
+              <a:t>│   ├── entities/                      </a:t>
+            </a:r>
+            <a:r>
+              <a:rPr lang="ru-RU" dirty="0"/>
+              <a:t>          </a:t>
+            </a:r>
+            <a:r>
+              <a:rPr lang="en-US" dirty="0"/>
+              <a:t># </a:t>
             </a:r>
             <a:r>
               <a:rPr lang="ru-RU" dirty="0"/>
@@ -4221,7 +4373,15 @@
             </a:r>
             <a:r>
               <a:rPr lang="en-US" dirty="0"/>
-              <a:t>init__.py                  # </a:t>
+              <a:t>init__.py                  </a:t>
+            </a:r>
+            <a:r>
+              <a:rPr lang="ru-RU" dirty="0"/>
+              <a:t>        </a:t>
+            </a:r>
+            <a:r>
+              <a:rPr lang="en-US" dirty="0"/>
+              <a:t># </a:t>
             </a:r>
             <a:r>
               <a:rPr lang="ru-RU" dirty="0"/>
@@ -4235,7 +4395,15 @@
             </a:r>
             <a:r>
               <a:rPr lang="en-US" dirty="0"/>
-              <a:t>tile.py                      # </a:t>
+              <a:t>tile.py                      </a:t>
+            </a:r>
+            <a:r>
+              <a:rPr lang="ru-RU" dirty="0"/>
+              <a:t>             </a:t>
+            </a:r>
+            <a:r>
+              <a:rPr lang="en-US" dirty="0"/>
+              <a:t># </a:t>
             </a:r>
             <a:r>
               <a:rPr lang="ru-RU" dirty="0"/>
@@ -4249,7 +4417,15 @@
             </a:r>
             <a:r>
               <a:rPr lang="en-US" dirty="0"/>
-              <a:t>word.py                      # </a:t>
+              <a:t>word.py                      </a:t>
+            </a:r>
+            <a:r>
+              <a:rPr lang="ru-RU" dirty="0"/>
+              <a:t>          </a:t>
+            </a:r>
+            <a:r>
+              <a:rPr lang="en-US" dirty="0"/>
+              <a:t># </a:t>
             </a:r>
             <a:r>
               <a:rPr lang="ru-RU" dirty="0"/>
@@ -4263,7 +4439,15 @@
             </a:r>
             <a:r>
               <a:rPr lang="en-US" dirty="0"/>
-              <a:t>levels/                        # </a:t>
+              <a:t>levels/                        </a:t>
+            </a:r>
+            <a:r>
+              <a:rPr lang="ru-RU" dirty="0"/>
+              <a:t>            </a:t>
+            </a:r>
+            <a:r>
+              <a:rPr lang="en-US" dirty="0"/>
+              <a:t># </a:t>
             </a:r>
             <a:r>
               <a:rPr lang="ru-RU" dirty="0"/>
@@ -4277,7 +4461,23 @@
             </a:r>
             <a:r>
               <a:rPr lang="en-US" dirty="0"/>
-              <a:t>init__.py                  # </a:t>
+              <a:t>init__.py                 </a:t>
+            </a:r>
+            <a:r>
+              <a:rPr lang="ru-RU" dirty="0"/>
+              <a:t>    </a:t>
+            </a:r>
+            <a:r>
+              <a:rPr lang="en-US" dirty="0"/>
+              <a:t> </a:t>
+            </a:r>
+            <a:r>
+              <a:rPr lang="ru-RU" dirty="0"/>
+              <a:t>     </a:t>
+            </a:r>
+            <a:r>
+              <a:rPr lang="en-US" dirty="0"/>
+              <a:t># </a:t>
             </a:r>
             <a:r>
               <a:rPr lang="ru-RU" dirty="0"/>
@@ -4291,7 +4491,15 @@
             </a:r>
             <a:r>
               <a:rPr lang="en-US" dirty="0"/>
-              <a:t>level_loader.py              # </a:t>
+              <a:t>level_loader.py              </a:t>
+            </a:r>
+            <a:r>
+              <a:rPr lang="ru-RU" dirty="0"/>
+              <a:t>     </a:t>
+            </a:r>
+            <a:r>
+              <a:rPr lang="en-US" dirty="0"/>
+              <a:t># </a:t>
             </a:r>
             <a:r>
               <a:rPr lang="ru-RU" dirty="0"/>
@@ -4305,7 +4513,15 @@
             </a:r>
             <a:r>
               <a:rPr lang="en-US" dirty="0"/>
-              <a:t>level_manager.py             # </a:t>
+              <a:t>level_manager.py           </a:t>
+            </a:r>
+            <a:r>
+              <a:rPr lang="ru-RU" dirty="0"/>
+              <a:t>    </a:t>
+            </a:r>
+            <a:r>
+              <a:rPr lang="en-US" dirty="0"/>
+              <a:t># </a:t>
             </a:r>
             <a:r>
               <a:rPr lang="ru-RU" dirty="0"/>
@@ -4319,7 +4535,15 @@
             </a:r>
             <a:r>
               <a:rPr lang="en-US" dirty="0"/>
-              <a:t>config.py                          # </a:t>
+              <a:t>config.py                         </a:t>
+            </a:r>
+            <a:r>
+              <a:rPr lang="ru-RU" dirty="0"/>
+              <a:t>          </a:t>
+            </a:r>
+            <a:r>
+              <a:rPr lang="en-US" dirty="0"/>
+              <a:t># </a:t>
             </a:r>
             <a:r>
               <a:rPr lang="ru-RU" dirty="0"/>
@@ -4333,7 +4557,15 @@
             </a:r>
             <a:r>
               <a:rPr lang="en-US" dirty="0"/>
-              <a:t>requirements.txt                   # </a:t>
+              <a:t>requirements.txt             </a:t>
+            </a:r>
+            <a:r>
+              <a:rPr lang="ru-RU" dirty="0"/>
+              <a:t>        </a:t>
+            </a:r>
+            <a:r>
+              <a:rPr lang="en-US" dirty="0"/>
+              <a:t># </a:t>
             </a:r>
             <a:r>
               <a:rPr lang="ru-RU" dirty="0"/>
@@ -4347,7 +4579,15 @@
             </a:r>
             <a:r>
               <a:rPr lang="en-US" dirty="0"/>
-              <a:t>README.md                          # </a:t>
+              <a:t>README.md                          </a:t>
+            </a:r>
+            <a:r>
+              <a:rPr lang="ru-RU" dirty="0"/>
+              <a:t>  </a:t>
+            </a:r>
+            <a:r>
+              <a:rPr lang="en-US" dirty="0"/>
+              <a:t># </a:t>
             </a:r>
             <a:r>
               <a:rPr lang="ru-RU" dirty="0"/>
@@ -4361,7 +4601,15 @@
             </a:r>
             <a:r>
               <a:rPr lang="en-US" dirty="0"/>
-              <a:t>tests/                             # </a:t>
+              <a:t>tests/                             </a:t>
+            </a:r>
+            <a:r>
+              <a:rPr lang="ru-RU" dirty="0"/>
+              <a:t>            </a:t>
+            </a:r>
+            <a:r>
+              <a:rPr lang="en-US" dirty="0"/>
+              <a:t># </a:t>
             </a:r>
             <a:r>
               <a:rPr lang="ru-RU" dirty="0"/>
@@ -4375,7 +4623,15 @@
             </a:r>
             <a:r>
               <a:rPr lang="en-US" dirty="0"/>
-              <a:t>test_game.py                     # </a:t>
+              <a:t>test_game.py                     </a:t>
+            </a:r>
+            <a:r>
+              <a:rPr lang="ru-RU" dirty="0"/>
+              <a:t>     </a:t>
+            </a:r>
+            <a:r>
+              <a:rPr lang="en-US" dirty="0"/>
+              <a:t># </a:t>
             </a:r>
             <a:r>
               <a:rPr lang="ru-RU" dirty="0"/>
@@ -4389,7 +4645,15 @@
             </a:r>
             <a:r>
               <a:rPr lang="en-US" dirty="0"/>
-              <a:t>test_levels.py                   # </a:t>
+              <a:t>test_levels.py                   </a:t>
+            </a:r>
+            <a:r>
+              <a:rPr lang="ru-RU" dirty="0"/>
+              <a:t>       </a:t>
+            </a:r>
+            <a:r>
+              <a:rPr lang="en-US" dirty="0"/>
+              <a:t># </a:t>
             </a:r>
             <a:r>
               <a:rPr lang="ru-RU" dirty="0"/>
@@ -4403,7 +4667,15 @@
             </a:r>
             <a:r>
               <a:rPr lang="en-US" dirty="0"/>
-              <a:t>test_graphics.py                 # </a:t>
+              <a:t>test_graphics.py                 </a:t>
+            </a:r>
+            <a:r>
+              <a:rPr lang="ru-RU" dirty="0"/>
+              <a:t>    </a:t>
+            </a:r>
+            <a:r>
+              <a:rPr lang="en-US" dirty="0"/>
+              <a:t># </a:t>
             </a:r>
             <a:r>
               <a:rPr lang="ru-RU" dirty="0"/>
@@ -4470,8 +4742,8 @@
           <a:lstStyle/>
           <a:p>
             <a:r>
-              <a:rPr lang="ru-RU"/>
-              <a:t>Основные механики</a:t>
+              <a:rPr lang="ru-RU" b="1" dirty="0"/>
+              <a:t>Основные механики игры</a:t>
             </a:r>
           </a:p>
         </p:txBody>
@@ -4517,7 +4789,14 @@
           <a:p>
             <a:r>
               <a:rPr lang="ru-RU" dirty="0"/>
-              <a:t>Сложность увеличивается за счёт усложнения списка слов</a:t>
+              <a:t>Сложность увеличивается за счёт увеличения списка слов</a:t>
+            </a:r>
+            <a:endParaRPr lang="en-US" dirty="0"/>
+          </a:p>
+          <a:p>
+            <a:r>
+              <a:rPr lang="ru-RU" dirty="0"/>
+              <a:t>Слова хранятся в базе данных и могут обновляться</a:t>
             </a:r>
           </a:p>
         </p:txBody>
@@ -4574,7 +4853,7 @@
           <a:lstStyle/>
           <a:p>
             <a:r>
-              <a:rPr lang="ru-RU" dirty="0"/>
+              <a:rPr lang="ru-RU" b="1" dirty="0"/>
               <a:t>Главы и уровни игры</a:t>
             </a:r>
           </a:p>
@@ -4672,7 +4951,7 @@
           <a:lstStyle/>
           <a:p>
             <a:r>
-              <a:rPr lang="ru-RU"/>
+              <a:rPr lang="ru-RU" b="1" dirty="0"/>
               <a:t>База данных</a:t>
             </a:r>
           </a:p>
@@ -4827,7 +5106,7 @@
           <a:lstStyle/>
           <a:p>
             <a:r>
-              <a:rPr lang="ru-RU"/>
+              <a:rPr lang="ru-RU" b="1" dirty="0"/>
               <a:t>Интерфейс и дизайн</a:t>
             </a:r>
           </a:p>
@@ -4862,7 +5141,23 @@
           <a:p>
             <a:r>
               <a:rPr lang="ru-RU" dirty="0"/>
-              <a:t>Удобное меню, HUD с очками, таймером и подсказками</a:t>
+              <a:t>Удобное меню, </a:t>
+            </a:r>
+            <a:r>
+              <a:rPr lang="en-US" dirty="0"/>
+              <a:t>Head-Up Display (</a:t>
+            </a:r>
+            <a:r>
+              <a:rPr lang="ru-RU" dirty="0"/>
+              <a:t>HUD</a:t>
+            </a:r>
+            <a:r>
+              <a:rPr lang="en-US" dirty="0"/>
+              <a:t>)</a:t>
+            </a:r>
+            <a:r>
+              <a:rPr lang="ru-RU" dirty="0"/>
+              <a:t> с очками, таймером и подсказками</a:t>
             </a:r>
           </a:p>
           <a:p>
@@ -4925,7 +5220,7 @@
           <a:lstStyle/>
           <a:p>
             <a:r>
-              <a:rPr lang="ru-RU"/>
+              <a:rPr lang="ru-RU" b="1" dirty="0"/>
               <a:t>Заключение</a:t>
             </a:r>
           </a:p>
@@ -4966,7 +5261,15 @@
           <a:p>
             <a:r>
               <a:rPr lang="ru-RU" dirty="0"/>
-              <a:t>Возможны дальнейшие улучшения: новые уровни, сетевой режим, мобильная версия</a:t>
+              <a:t>Возможны дальнейшие улучшения: новые уровни</a:t>
+            </a:r>
+            <a:r>
+              <a:rPr lang="en-US" dirty="0"/>
+              <a:t> </a:t>
+            </a:r>
+            <a:r>
+              <a:rPr lang="ru-RU" dirty="0"/>
+              <a:t>и главы, сетевой режим, мобильная версия</a:t>
             </a:r>
           </a:p>
         </p:txBody>

</xml_diff>